<commit_message>
Print documentos atualizados(protoPersona - userStory)
</commit_message>
<xml_diff>
--- a/Documentação/Proto persona.pptx
+++ b/Documentação/Proto persona.pptx
@@ -116,6 +116,7 @@
 <p1510:revInfo xmlns:a="http://schemas.openxmlformats.org/drawingml/2006/main" xmlns:r="http://schemas.openxmlformats.org/officeDocument/2006/relationships" xmlns:p1510="http://schemas.microsoft.com/office/powerpoint/2015/10/main">
   <p1510:revLst>
     <p1510:client id="{E3392906-78E0-4DDB-2EBE-6EFDE4965E9E}" v="1" dt="2019-03-13T16:57:48.461"/>
+    <p1510:client id="{8B1FDB72-C5DD-EAAF-2C33-DC0DB408522C}" v="3" dt="2019-03-14T14:23:04.188"/>
   </p1510:revLst>
 </p1510:revInfo>
 </file>
@@ -215,6 +216,78 @@
             <ac:spMk id="13" creationId="{D0820D2B-3825-47ED-898A-DF3DDA4A8B0C}"/>
           </ac:spMkLst>
         </pc:spChg>
+      </pc:sldChg>
+    </pc:docChg>
+  </pc:docChgLst>
+  <pc:docChgLst>
+    <pc:chgData name="CRISTIELEN OLIVEIRA DE BARROS" userId="S::cristielen.barros@bandtec.com.br::2181d953-4f05-4edb-b0c3-63d4992e1bef" providerId="AD" clId="Web-{8B1FDB72-C5DD-EAAF-2C33-DC0DB408522C}"/>
+    <pc:docChg chg="modSld">
+      <pc:chgData name="CRISTIELEN OLIVEIRA DE BARROS" userId="S::cristielen.barros@bandtec.com.br::2181d953-4f05-4edb-b0c3-63d4992e1bef" providerId="AD" clId="Web-{8B1FDB72-C5DD-EAAF-2C33-DC0DB408522C}" dt="2019-03-14T14:25:10.179" v="447" actId="20577"/>
+      <pc:docMkLst>
+        <pc:docMk/>
+      </pc:docMkLst>
+      <pc:sldChg chg="modSp">
+        <pc:chgData name="CRISTIELEN OLIVEIRA DE BARROS" userId="S::cristielen.barros@bandtec.com.br::2181d953-4f05-4edb-b0c3-63d4992e1bef" providerId="AD" clId="Web-{8B1FDB72-C5DD-EAAF-2C33-DC0DB408522C}" dt="2019-03-14T14:25:09.304" v="445" actId="20577"/>
+        <pc:sldMkLst>
+          <pc:docMk/>
+          <pc:sldMk cId="109857222" sldId="256"/>
+        </pc:sldMkLst>
+        <pc:spChg chg="mod ord">
+          <ac:chgData name="CRISTIELEN OLIVEIRA DE BARROS" userId="S::cristielen.barros@bandtec.com.br::2181d953-4f05-4edb-b0c3-63d4992e1bef" providerId="AD" clId="Web-{8B1FDB72-C5DD-EAAF-2C33-DC0DB408522C}" dt="2019-03-14T14:24:52.710" v="438" actId="14100"/>
+          <ac:spMkLst>
+            <pc:docMk/>
+            <pc:sldMk cId="109857222" sldId="256"/>
+            <ac:spMk id="7" creationId="{3D9A86D2-8528-4F10-B848-FF2BF357A195}"/>
+          </ac:spMkLst>
+        </pc:spChg>
+        <pc:spChg chg="mod">
+          <ac:chgData name="CRISTIELEN OLIVEIRA DE BARROS" userId="S::cristielen.barros@bandtec.com.br::2181d953-4f05-4edb-b0c3-63d4992e1bef" providerId="AD" clId="Web-{8B1FDB72-C5DD-EAAF-2C33-DC0DB408522C}" dt="2019-03-14T14:24:55.068" v="439" actId="14100"/>
+          <ac:spMkLst>
+            <pc:docMk/>
+            <pc:sldMk cId="109857222" sldId="256"/>
+            <ac:spMk id="8" creationId="{9FC7BB52-E36D-4D99-AA71-FA3A64D302AD}"/>
+          </ac:spMkLst>
+        </pc:spChg>
+        <pc:spChg chg="mod ord">
+          <ac:chgData name="CRISTIELEN OLIVEIRA DE BARROS" userId="S::cristielen.barros@bandtec.com.br::2181d953-4f05-4edb-b0c3-63d4992e1bef" providerId="AD" clId="Web-{8B1FDB72-C5DD-EAAF-2C33-DC0DB408522C}" dt="2019-03-14T14:24:36.288" v="434" actId="14100"/>
+          <ac:spMkLst>
+            <pc:docMk/>
+            <pc:sldMk cId="109857222" sldId="256"/>
+            <ac:spMk id="9" creationId="{0EC8009A-11B5-4047-BC0A-BA5EC381138B}"/>
+          </ac:spMkLst>
+        </pc:spChg>
+        <pc:spChg chg="mod ord">
+          <ac:chgData name="CRISTIELEN OLIVEIRA DE BARROS" userId="S::cristielen.barros@bandtec.com.br::2181d953-4f05-4edb-b0c3-63d4992e1bef" providerId="AD" clId="Web-{8B1FDB72-C5DD-EAAF-2C33-DC0DB408522C}" dt="2019-03-14T14:16:57.248" v="16"/>
+          <ac:spMkLst>
+            <pc:docMk/>
+            <pc:sldMk cId="109857222" sldId="256"/>
+            <ac:spMk id="11" creationId="{FB8F4EAF-CDDE-4A28-BE33-1C73ED1A9F0A}"/>
+          </ac:spMkLst>
+        </pc:spChg>
+        <pc:spChg chg="mod ord">
+          <ac:chgData name="CRISTIELEN OLIVEIRA DE BARROS" userId="S::cristielen.barros@bandtec.com.br::2181d953-4f05-4edb-b0c3-63d4992e1bef" providerId="AD" clId="Web-{8B1FDB72-C5DD-EAAF-2C33-DC0DB408522C}" dt="2019-03-14T14:25:09.304" v="445" actId="20577"/>
+          <ac:spMkLst>
+            <pc:docMk/>
+            <pc:sldMk cId="109857222" sldId="256"/>
+            <ac:spMk id="12" creationId="{264008D8-859A-4589-B769-9E047545CFAC}"/>
+          </ac:spMkLst>
+        </pc:spChg>
+        <pc:spChg chg="mod">
+          <ac:chgData name="CRISTIELEN OLIVEIRA DE BARROS" userId="S::cristielen.barros@bandtec.com.br::2181d953-4f05-4edb-b0c3-63d4992e1bef" providerId="AD" clId="Web-{8B1FDB72-C5DD-EAAF-2C33-DC0DB408522C}" dt="2019-03-14T14:24:40.819" v="435" actId="1076"/>
+          <ac:spMkLst>
+            <pc:docMk/>
+            <pc:sldMk cId="109857222" sldId="256"/>
+            <ac:spMk id="13" creationId="{D0820D2B-3825-47ED-898A-DF3DDA4A8B0C}"/>
+          </ac:spMkLst>
+        </pc:spChg>
+        <pc:picChg chg="mod ord">
+          <ac:chgData name="CRISTIELEN OLIVEIRA DE BARROS" userId="S::cristielen.barros@bandtec.com.br::2181d953-4f05-4edb-b0c3-63d4992e1bef" providerId="AD" clId="Web-{8B1FDB72-C5DD-EAAF-2C33-DC0DB408522C}" dt="2019-03-14T14:23:43.081" v="417" actId="14100"/>
+          <ac:picMkLst>
+            <pc:docMk/>
+            <pc:sldMk cId="109857222" sldId="256"/>
+            <ac:picMk id="2" creationId="{DED57578-EEF7-412A-8AC2-15DE66CBC627}"/>
+          </ac:picMkLst>
+        </pc:picChg>
       </pc:sldChg>
     </pc:docChg>
   </pc:docChgLst>
@@ -3152,8 +3225,8 @@
         </p:nvSpPr>
         <p:spPr>
           <a:xfrm>
-            <a:off x="1266287" y="238305"/>
-            <a:ext cx="4767531" cy="2898476"/>
+            <a:off x="1266287" y="51400"/>
+            <a:ext cx="4609381" cy="3588588"/>
           </a:xfrm>
           <a:prstGeom prst="roundRect">
             <a:avLst/>
@@ -3197,8 +3270,8 @@
         </p:nvSpPr>
         <p:spPr>
           <a:xfrm>
-            <a:off x="6039569" y="238304"/>
-            <a:ext cx="4781908" cy="2912853"/>
+            <a:off x="5881419" y="51399"/>
+            <a:ext cx="4940058" cy="3588588"/>
           </a:xfrm>
           <a:prstGeom prst="roundRect">
             <a:avLst/>
@@ -3242,8 +3315,8 @@
         </p:nvSpPr>
         <p:spPr>
           <a:xfrm>
-            <a:off x="1108137" y="3128154"/>
-            <a:ext cx="9713338" cy="3732361"/>
+            <a:off x="1108137" y="3688870"/>
+            <a:ext cx="9713338" cy="3171645"/>
           </a:xfrm>
           <a:prstGeom prst="roundRect">
             <a:avLst/>
@@ -3277,78 +3350,6 @@
       </p:sp>
       <p:sp>
         <p:nvSpPr>
-          <p:cNvPr id="11" name="TextBox 10">
-            <a:extLst>
-              <a:ext uri="{FF2B5EF4-FFF2-40B4-BE49-F238E27FC236}">
-                <a16:creationId xmlns:a16="http://schemas.microsoft.com/office/drawing/2014/main" id="{FB8F4EAF-CDDE-4A28-BE33-1C73ED1A9F0A}"/>
-              </a:ext>
-            </a:extLst>
-          </p:cNvPr>
-          <p:cNvSpPr txBox="1"/>
-          <p:nvPr/>
-        </p:nvSpPr>
-        <p:spPr>
-          <a:xfrm>
-            <a:off x="1817478" y="509138"/>
-            <a:ext cx="3807124" cy="1384995"/>
-          </a:xfrm>
-          <a:prstGeom prst="rect">
-            <a:avLst/>
-          </a:prstGeom>
-        </p:spPr>
-        <p:txBody>
-          <a:bodyPr rot="0" spcFirstLastPara="0" vertOverflow="overflow" horzOverflow="overflow" vert="horz" wrap="square" lIns="91440" tIns="45720" rIns="91440" bIns="45720" numCol="1" spcCol="0" rtlCol="0" fromWordArt="0" anchor="t" anchorCtr="0" forceAA="0" compatLnSpc="1">
-            <a:prstTxWarp prst="textNoShape">
-              <a:avLst/>
-            </a:prstTxWarp>
-            <a:spAutoFit/>
-          </a:bodyPr>
-          <a:lstStyle/>
-          <a:p>
-            <a:r>
-              <a:rPr lang="pt-BR" sz="2400" b="1" dirty="0">
-                <a:solidFill>
-                  <a:schemeClr val="accent1">
-                    <a:lumMod val="50000"/>
-                  </a:schemeClr>
-                </a:solidFill>
-                <a:latin typeface="Aharoni"/>
-                <a:cs typeface="Aharoni"/>
-              </a:rPr>
-              <a:t>Quem?</a:t>
-            </a:r>
-            <a:r>
-              <a:rPr lang="pt-BR" dirty="0">
-                <a:latin typeface="Aharoni"/>
-                <a:cs typeface="Aharoni"/>
-              </a:rPr>
-              <a:t> </a:t>
-            </a:r>
-          </a:p>
-          <a:p>
-            <a:endParaRPr lang="pt-BR" dirty="0">
-              <a:latin typeface="Aharoni"/>
-              <a:cs typeface="Calibri"/>
-            </a:endParaRPr>
-          </a:p>
-          <a:p>
-            <a:r>
-              <a:rPr lang="pt-BR" sz="2400" i="1" dirty="0">
-                <a:latin typeface="Aharoni"/>
-                <a:cs typeface="Calibri"/>
-              </a:rPr>
-              <a:t>Empresas Bancarias.</a:t>
-            </a:r>
-          </a:p>
-          <a:p>
-            <a:endParaRPr lang="en-US" dirty="0">
-              <a:cs typeface="Calibri"/>
-            </a:endParaRPr>
-          </a:p>
-        </p:txBody>
-      </p:sp>
-      <p:sp>
-        <p:nvSpPr>
           <p:cNvPr id="12" name="TextBox 11">
             <a:extLst>
               <a:ext uri="{FF2B5EF4-FFF2-40B4-BE49-F238E27FC236}">
@@ -3361,8 +3362,8 @@
         </p:nvSpPr>
         <p:spPr>
           <a:xfrm>
-            <a:off x="6345447" y="508240"/>
-            <a:ext cx="4425349" cy="2893100"/>
+            <a:off x="6302315" y="48165"/>
+            <a:ext cx="4425349" cy="4431983"/>
           </a:xfrm>
           <a:prstGeom prst="rect">
             <a:avLst/>
@@ -3377,7 +3378,6 @@
           </a:bodyPr>
           <a:lstStyle/>
           <a:p>
-            <a:pPr algn="l"/>
             <a:r>
               <a:rPr lang="pt-BR" sz="2400" b="1" dirty="0">
                 <a:solidFill>
@@ -3390,30 +3390,170 @@
               </a:rPr>
               <a:t>Informações/Comportamento</a:t>
             </a:r>
-          </a:p>
-          <a:p>
-            <a:endParaRPr lang="pt-BR" sz="2400" b="1" dirty="0">
+            <a:endParaRPr lang="pt-BR" sz="2400">
               <a:solidFill>
                 <a:schemeClr val="accent1">
                   <a:lumMod val="50000"/>
                 </a:schemeClr>
               </a:solidFill>
+              <a:cs typeface="Calibri"/>
+            </a:endParaRPr>
+          </a:p>
+          <a:p>
+            <a:pPr marL="171450" indent="-171450">
+              <a:buFont typeface="Arial"/>
+              <a:buChar char="•"/>
+            </a:pPr>
+            <a:r>
+              <a:rPr lang="pt-BR" sz="1600" b="1" dirty="0">
+                <a:latin typeface="Aharoni"/>
+                <a:cs typeface="Calibri"/>
+              </a:rPr>
+              <a:t>Caixas eletrônicos com funcionamento 24 horas</a:t>
+            </a:r>
+          </a:p>
+          <a:p>
+            <a:pPr marL="171450" indent="-171450">
+              <a:buFont typeface="Arial"/>
+              <a:buChar char="•"/>
+            </a:pPr>
+            <a:r>
+              <a:rPr lang="pt-BR" sz="1600" b="1" dirty="0">
+                <a:latin typeface="Aharoni"/>
+                <a:cs typeface="Calibri"/>
+              </a:rPr>
+              <a:t>Alocado nas agências dos bancos</a:t>
+            </a:r>
+          </a:p>
+          <a:p>
+            <a:pPr marL="171450" indent="-171450">
+              <a:buFont typeface="Arial"/>
+              <a:buChar char="•"/>
+            </a:pPr>
+            <a:r>
+              <a:rPr lang="pt-BR" sz="1600" b="1" dirty="0">
+                <a:latin typeface="Aharoni"/>
+                <a:cs typeface="Calibri"/>
+              </a:rPr>
+              <a:t>Acompanha para funcionamento sistema operacional</a:t>
+            </a:r>
+          </a:p>
+          <a:p>
+            <a:pPr marL="171450" indent="-171450">
+              <a:buFont typeface="Arial"/>
+              <a:buChar char="•"/>
+            </a:pPr>
+            <a:r>
+              <a:rPr lang="pt-BR" sz="1600" b="1" dirty="0">
+                <a:latin typeface="Aharoni"/>
+                <a:cs typeface="Calibri"/>
+              </a:rPr>
+              <a:t>Disponibiliza serviços como:</a:t>
+            </a:r>
+          </a:p>
+          <a:p>
+            <a:pPr marL="628650" lvl="1" indent="-171450">
+              <a:buFont typeface="Arial"/>
+              <a:buChar char="•"/>
+            </a:pPr>
+            <a:r>
+              <a:rPr lang="pt-BR" sz="1600" b="1" dirty="0">
+                <a:latin typeface="Aharoni"/>
+                <a:cs typeface="Calibri"/>
+              </a:rPr>
+              <a:t>Saque</a:t>
+            </a:r>
+          </a:p>
+          <a:p>
+            <a:pPr marL="628650" lvl="1" indent="-171450">
+              <a:buFont typeface="Arial"/>
+              <a:buChar char="•"/>
+            </a:pPr>
+            <a:r>
+              <a:rPr lang="pt-BR" sz="1600" b="1" dirty="0">
+                <a:latin typeface="Aharoni"/>
+                <a:cs typeface="Calibri"/>
+              </a:rPr>
+              <a:t>Pagamento</a:t>
+            </a:r>
+          </a:p>
+          <a:p>
+            <a:pPr marL="628650" lvl="1" indent="-171450">
+              <a:buFont typeface="Arial"/>
+              <a:buChar char="•"/>
+            </a:pPr>
+            <a:r>
+              <a:rPr lang="pt-BR" sz="1600" b="1" dirty="0">
+                <a:latin typeface="Aharoni"/>
+                <a:cs typeface="Calibri"/>
+              </a:rPr>
+              <a:t>Recarga</a:t>
+            </a:r>
+          </a:p>
+          <a:p>
+            <a:pPr marL="628650" lvl="1" indent="-171450">
+              <a:buFont typeface="Arial"/>
+              <a:buChar char="•"/>
+            </a:pPr>
+            <a:r>
+              <a:rPr lang="pt-BR" sz="1600" b="1" dirty="0">
+                <a:latin typeface="Aharoni"/>
+                <a:cs typeface="Calibri"/>
+              </a:rPr>
+              <a:t>Simulação de empréstimo</a:t>
+            </a:r>
+          </a:p>
+          <a:p>
+            <a:pPr marL="628650" lvl="1" indent="-171450">
+              <a:buFont typeface="Arial"/>
+              <a:buChar char="•"/>
+            </a:pPr>
+            <a:r>
+              <a:rPr lang="pt-BR" sz="1600" b="1" dirty="0">
+                <a:latin typeface="Aharoni"/>
+                <a:cs typeface="Calibri"/>
+              </a:rPr>
+              <a:t>Extrato</a:t>
+            </a:r>
+          </a:p>
+          <a:p>
+            <a:pPr marL="628650" lvl="1" indent="-171450">
+              <a:buFont typeface="Arial"/>
+              <a:buChar char="•"/>
+            </a:pPr>
+            <a:r>
+              <a:rPr lang="pt-BR" sz="1600" b="1" dirty="0">
+                <a:latin typeface="Aharoni"/>
+                <a:cs typeface="Calibri"/>
+              </a:rPr>
+              <a:t>Cheques</a:t>
+            </a:r>
+          </a:p>
+          <a:p>
+            <a:pPr marL="628650" lvl="1" indent="-171450">
+              <a:buFont typeface="Arial"/>
+              <a:buChar char="•"/>
+            </a:pPr>
+            <a:r>
+              <a:rPr lang="pt-BR" sz="1600" b="1" dirty="0">
+                <a:latin typeface="Aharoni"/>
+                <a:cs typeface="Calibri"/>
+              </a:rPr>
+              <a:t>Transações</a:t>
+            </a:r>
+          </a:p>
+          <a:p>
+            <a:pPr marL="171450" indent="-171450">
+              <a:buFont typeface="Arial"/>
+              <a:buChar char="•"/>
+            </a:pPr>
+            <a:endParaRPr lang="pt-BR" sz="1200" b="1" dirty="0">
+              <a:solidFill>
+                <a:srgbClr val="203864"/>
+              </a:solidFill>
               <a:latin typeface="Aharoni"/>
               <a:cs typeface="Calibri"/>
             </a:endParaRPr>
-          </a:p>
-          <a:p>
-            <a:pPr marL="342900" indent="-342900" algn="just">
-              <a:buFont typeface="Arial"/>
-              <a:buChar char="•"/>
-            </a:pPr>
-            <a:r>
-              <a:rPr lang="pt-BR" sz="2400" i="1" dirty="0">
-                <a:latin typeface="Aharoni"/>
-                <a:cs typeface="Calibri"/>
-              </a:rPr>
-              <a:t>Caixas eletrônicos operados com sistemas operacionais (diversos tipos).</a:t>
-            </a:r>
           </a:p>
           <a:p>
             <a:pPr marL="342900" indent="-342900" algn="just">
@@ -3421,6 +3561,9 @@
               <a:buChar char="•"/>
             </a:pPr>
             <a:endParaRPr lang="en-US" i="1" dirty="0">
+              <a:solidFill>
+                <a:srgbClr val="000000"/>
+              </a:solidFill>
               <a:latin typeface="Calisto MT"/>
               <a:cs typeface="Calibri"/>
             </a:endParaRPr>
@@ -3438,121 +3581,6 @@
               </a:solidFill>
               <a:cs typeface="Calibri"/>
             </a:endParaRPr>
-          </a:p>
-        </p:txBody>
-      </p:sp>
-      <p:sp>
-        <p:nvSpPr>
-          <p:cNvPr id="13" name="TextBox 12">
-            <a:extLst>
-              <a:ext uri="{FF2B5EF4-FFF2-40B4-BE49-F238E27FC236}">
-                <a16:creationId xmlns:a16="http://schemas.microsoft.com/office/drawing/2014/main" id="{D0820D2B-3825-47ED-898A-DF3DDA4A8B0C}"/>
-              </a:ext>
-            </a:extLst>
-          </p:cNvPr>
-          <p:cNvSpPr txBox="1"/>
-          <p:nvPr/>
-        </p:nvSpPr>
-        <p:spPr>
-          <a:xfrm>
-            <a:off x="1326852" y="3354059"/>
-            <a:ext cx="9313649" cy="3416320"/>
-          </a:xfrm>
-          <a:prstGeom prst="rect">
-            <a:avLst/>
-          </a:prstGeom>
-        </p:spPr>
-        <p:style>
-          <a:lnRef idx="2">
-            <a:schemeClr val="accent3"/>
-          </a:lnRef>
-          <a:fillRef idx="1">
-            <a:schemeClr val="lt1"/>
-          </a:fillRef>
-          <a:effectRef idx="0">
-            <a:schemeClr val="accent3"/>
-          </a:effectRef>
-          <a:fontRef idx="minor">
-            <a:schemeClr val="dk1"/>
-          </a:fontRef>
-        </p:style>
-        <p:txBody>
-          <a:bodyPr rot="0" spcFirstLastPara="0" vertOverflow="overflow" horzOverflow="overflow" vert="horz" wrap="square" lIns="91440" tIns="45720" rIns="91440" bIns="45720" numCol="1" spcCol="0" rtlCol="0" fromWordArt="0" anchor="t" anchorCtr="0" forceAA="0" compatLnSpc="1">
-            <a:prstTxWarp prst="textNoShape">
-              <a:avLst/>
-            </a:prstTxWarp>
-            <a:spAutoFit/>
-          </a:bodyPr>
-          <a:lstStyle/>
-          <a:p>
-            <a:pPr algn="just"/>
-            <a:r>
-              <a:rPr lang="pt-BR" sz="2400" b="1" dirty="0">
-                <a:solidFill>
-                  <a:schemeClr val="accent1">
-                    <a:lumMod val="50000"/>
-                  </a:schemeClr>
-                </a:solidFill>
-                <a:latin typeface="Aharoni"/>
-                <a:cs typeface="Aharoni"/>
-              </a:rPr>
-              <a:t>Dores e necessidades</a:t>
-            </a:r>
-            <a:endParaRPr lang="pt-BR" sz="2400">
-              <a:solidFill>
-                <a:schemeClr val="accent1">
-                  <a:lumMod val="50000"/>
-                </a:schemeClr>
-              </a:solidFill>
-              <a:latin typeface="Aharoni"/>
-              <a:cs typeface="Aharoni"/>
-            </a:endParaRPr>
-          </a:p>
-          <a:p>
-            <a:pPr algn="just"/>
-            <a:endParaRPr lang="pt-BR" sz="2400" dirty="0">
-              <a:latin typeface="Aharoni"/>
-              <a:cs typeface="Calibri"/>
-            </a:endParaRPr>
-          </a:p>
-          <a:p>
-            <a:pPr marL="285750" indent="-285750" algn="just">
-              <a:buFont typeface="Arial"/>
-              <a:buChar char="•"/>
-            </a:pPr>
-            <a:r>
-              <a:rPr lang="pt-BR" sz="2400" i="1" dirty="0">
-                <a:latin typeface="Aharoni"/>
-                <a:ea typeface="Batang"/>
-                <a:cs typeface="Calibri"/>
-              </a:rPr>
-              <a:t>Necessidade de monitoramento do sistema de caixas eletrônicos, para maior acertabilidade e mitigação de erros recorrentes aos componentes que envolve o sistema do mesmo.</a:t>
-            </a:r>
-          </a:p>
-          <a:p>
-            <a:pPr marL="285750" indent="-285750" algn="just">
-              <a:buFont typeface="Arial"/>
-              <a:buChar char="•"/>
-            </a:pPr>
-            <a:endParaRPr lang="pt-BR" sz="2400" i="1" dirty="0">
-              <a:latin typeface="Aharoni"/>
-              <a:ea typeface="Batang"/>
-              <a:cs typeface="Calibri"/>
-            </a:endParaRPr>
-          </a:p>
-          <a:p>
-            <a:pPr marL="285750" indent="-285750" algn="just">
-              <a:buFont typeface="Arial"/>
-              <a:buChar char="•"/>
-            </a:pPr>
-            <a:r>
-              <a:rPr lang="pt-BR" sz="2400" i="1" dirty="0">
-                <a:latin typeface="Aharoni"/>
-                <a:ea typeface="Batang"/>
-                <a:cs typeface="Calibri"/>
-              </a:rPr>
-              <a:t>Emitindo alertas e dispondo de gráficos e medias para consultas.</a:t>
-            </a:r>
           </a:p>
         </p:txBody>
       </p:sp>
@@ -3578,14 +3606,205 @@
         </p:blipFill>
         <p:spPr>
           <a:xfrm>
-            <a:off x="2033947" y="1681702"/>
-            <a:ext cx="1266107" cy="1280484"/>
+            <a:off x="2033947" y="1221627"/>
+            <a:ext cx="2401917" cy="2143124"/>
           </a:xfrm>
           <a:prstGeom prst="rect">
             <a:avLst/>
           </a:prstGeom>
         </p:spPr>
       </p:pic>
+      <p:sp>
+        <p:nvSpPr>
+          <p:cNvPr id="13" name="TextBox 12">
+            <a:extLst>
+              <a:ext uri="{FF2B5EF4-FFF2-40B4-BE49-F238E27FC236}">
+                <a16:creationId xmlns:a16="http://schemas.microsoft.com/office/drawing/2014/main" id="{D0820D2B-3825-47ED-898A-DF3DDA4A8B0C}"/>
+              </a:ext>
+            </a:extLst>
+          </p:cNvPr>
+          <p:cNvSpPr txBox="1"/>
+          <p:nvPr/>
+        </p:nvSpPr>
+        <p:spPr>
+          <a:xfrm>
+            <a:off x="1384361" y="4044173"/>
+            <a:ext cx="9313649" cy="2246769"/>
+          </a:xfrm>
+          <a:prstGeom prst="rect">
+            <a:avLst/>
+          </a:prstGeom>
+          <a:noFill/>
+          <a:ln>
+            <a:noFill/>
+          </a:ln>
+        </p:spPr>
+        <p:style>
+          <a:lnRef idx="2">
+            <a:schemeClr val="accent3"/>
+          </a:lnRef>
+          <a:fillRef idx="1">
+            <a:schemeClr val="lt1"/>
+          </a:fillRef>
+          <a:effectRef idx="0">
+            <a:schemeClr val="accent3"/>
+          </a:effectRef>
+          <a:fontRef idx="minor">
+            <a:schemeClr val="dk1"/>
+          </a:fontRef>
+        </p:style>
+        <p:txBody>
+          <a:bodyPr rot="0" spcFirstLastPara="0" vertOverflow="overflow" horzOverflow="overflow" vert="horz" wrap="square" lIns="91440" tIns="45720" rIns="91440" bIns="45720" numCol="1" spcCol="0" rtlCol="0" fromWordArt="0" anchor="t" anchorCtr="0" forceAA="0" compatLnSpc="1">
+            <a:prstTxWarp prst="textNoShape">
+              <a:avLst/>
+            </a:prstTxWarp>
+            <a:spAutoFit/>
+          </a:bodyPr>
+          <a:lstStyle/>
+          <a:p>
+            <a:pPr algn="just"/>
+            <a:r>
+              <a:rPr lang="pt-BR" sz="2000" b="1" dirty="0">
+                <a:solidFill>
+                  <a:schemeClr val="accent1">
+                    <a:lumMod val="50000"/>
+                  </a:schemeClr>
+                </a:solidFill>
+                <a:latin typeface="Aharoni"/>
+                <a:cs typeface="Aharoni"/>
+              </a:rPr>
+              <a:t>Dores e necessidades</a:t>
+            </a:r>
+            <a:endParaRPr lang="pt-BR" sz="2000">
+              <a:solidFill>
+                <a:schemeClr val="accent1">
+                  <a:lumMod val="50000"/>
+                </a:schemeClr>
+              </a:solidFill>
+              <a:latin typeface="Aharoni"/>
+              <a:cs typeface="Aharoni"/>
+            </a:endParaRPr>
+          </a:p>
+          <a:p>
+            <a:pPr algn="just"/>
+            <a:endParaRPr lang="pt-BR" sz="2000" dirty="0">
+              <a:latin typeface="Aharoni"/>
+              <a:cs typeface="Calibri"/>
+            </a:endParaRPr>
+          </a:p>
+          <a:p>
+            <a:pPr marL="285750" indent="-285750" algn="just">
+              <a:buFont typeface="Arial"/>
+              <a:buChar char="•"/>
+            </a:pPr>
+            <a:r>
+              <a:rPr lang="pt-BR" sz="2000" i="1" dirty="0">
+                <a:latin typeface="Aharoni"/>
+                <a:ea typeface="Batang"/>
+                <a:cs typeface="Calibri"/>
+              </a:rPr>
+              <a:t>Necessidade de monitoramento do sistema de caixas eletrônicos, para maior acertabilidade e mitigação de erros recorrentes aos componentes que envolve o sistema do mesmo.</a:t>
+            </a:r>
+          </a:p>
+          <a:p>
+            <a:pPr marL="285750" indent="-285750" algn="just">
+              <a:buFont typeface="Arial"/>
+              <a:buChar char="•"/>
+            </a:pPr>
+            <a:endParaRPr lang="pt-BR" sz="2000" i="1" dirty="0">
+              <a:latin typeface="Aharoni"/>
+              <a:ea typeface="Batang"/>
+              <a:cs typeface="Calibri"/>
+            </a:endParaRPr>
+          </a:p>
+          <a:p>
+            <a:pPr marL="285750" indent="-285750" algn="just">
+              <a:buFont typeface="Arial"/>
+              <a:buChar char="•"/>
+            </a:pPr>
+            <a:r>
+              <a:rPr lang="pt-BR" sz="2000" i="1" dirty="0">
+                <a:latin typeface="Aharoni"/>
+                <a:ea typeface="Batang"/>
+                <a:cs typeface="Calibri"/>
+              </a:rPr>
+              <a:t>Emitindo alertas e dispondo de gráficos e medias para consultas.</a:t>
+            </a:r>
+          </a:p>
+        </p:txBody>
+      </p:sp>
+      <p:sp>
+        <p:nvSpPr>
+          <p:cNvPr id="11" name="TextBox 10">
+            <a:extLst>
+              <a:ext uri="{FF2B5EF4-FFF2-40B4-BE49-F238E27FC236}">
+                <a16:creationId xmlns:a16="http://schemas.microsoft.com/office/drawing/2014/main" id="{FB8F4EAF-CDDE-4A28-BE33-1C73ED1A9F0A}"/>
+              </a:ext>
+            </a:extLst>
+          </p:cNvPr>
+          <p:cNvSpPr txBox="1"/>
+          <p:nvPr/>
+        </p:nvSpPr>
+        <p:spPr>
+          <a:xfrm>
+            <a:off x="1803101" y="408497"/>
+            <a:ext cx="3807124" cy="1384995"/>
+          </a:xfrm>
+          <a:prstGeom prst="rect">
+            <a:avLst/>
+          </a:prstGeom>
+        </p:spPr>
+        <p:txBody>
+          <a:bodyPr rot="0" spcFirstLastPara="0" vertOverflow="overflow" horzOverflow="overflow" vert="horz" wrap="square" lIns="91440" tIns="45720" rIns="91440" bIns="45720" numCol="1" spcCol="0" rtlCol="0" fromWordArt="0" anchor="t" anchorCtr="0" forceAA="0" compatLnSpc="1">
+            <a:prstTxWarp prst="textNoShape">
+              <a:avLst/>
+            </a:prstTxWarp>
+            <a:spAutoFit/>
+          </a:bodyPr>
+          <a:lstStyle/>
+          <a:p>
+            <a:r>
+              <a:rPr lang="pt-BR" sz="2400" b="1" dirty="0">
+                <a:solidFill>
+                  <a:schemeClr val="accent1">
+                    <a:lumMod val="50000"/>
+                  </a:schemeClr>
+                </a:solidFill>
+                <a:latin typeface="Aharoni"/>
+                <a:cs typeface="Aharoni"/>
+              </a:rPr>
+              <a:t>Quem?</a:t>
+            </a:r>
+            <a:r>
+              <a:rPr lang="pt-BR" dirty="0">
+                <a:latin typeface="Aharoni"/>
+                <a:cs typeface="Aharoni"/>
+              </a:rPr>
+              <a:t> </a:t>
+            </a:r>
+          </a:p>
+          <a:p>
+            <a:endParaRPr lang="pt-BR" dirty="0">
+              <a:latin typeface="Aharoni"/>
+              <a:cs typeface="Calibri"/>
+            </a:endParaRPr>
+          </a:p>
+          <a:p>
+            <a:r>
+              <a:rPr lang="pt-BR" sz="2400" i="1" dirty="0">
+                <a:latin typeface="Aharoni"/>
+                <a:cs typeface="Calibri"/>
+              </a:rPr>
+              <a:t>Empresas Bancarias.</a:t>
+            </a:r>
+          </a:p>
+          <a:p>
+            <a:endParaRPr lang="en-US" dirty="0">
+              <a:cs typeface="Calibri"/>
+            </a:endParaRPr>
+          </a:p>
+        </p:txBody>
+      </p:sp>
     </p:spTree>
     <p:extLst>
       <p:ext uri="{BB962C8B-B14F-4D97-AF65-F5344CB8AC3E}">
@@ -3867,15 +4086,6 @@
 </file>
 
 <file path=customXml/item2.xml><?xml version="1.0" encoding="utf-8"?>
-<?mso-contentType ?>
-<FormTemplates xmlns="http://schemas.microsoft.com/sharepoint/v3/contenttype/forms">
-  <Display>DocumentLibraryForm</Display>
-  <Edit>DocumentLibraryForm</Edit>
-  <New>DocumentLibraryForm</New>
-</FormTemplates>
-</file>
-
-<file path=customXml/item3.xml><?xml version="1.0" encoding="utf-8"?>
 <ct:contentTypeSchema xmlns:ct="http://schemas.microsoft.com/office/2006/metadata/contentType" xmlns:ma="http://schemas.microsoft.com/office/2006/metadata/properties/metaAttributes" ct:_="" ma:_="" ma:contentTypeName="Documento" ma:contentTypeID="0x010100F3CC155F2FBB72499B499F746BE7ADCD" ma:contentTypeVersion="5" ma:contentTypeDescription="Crie um novo documento." ma:contentTypeScope="" ma:versionID="7a35c2dbb781a0f0d10eced60772e7a6">
   <xsd:schema xmlns:xsd="http://www.w3.org/2001/XMLSchema" xmlns:xs="http://www.w3.org/2001/XMLSchema" xmlns:p="http://schemas.microsoft.com/office/2006/metadata/properties" xmlns:ns2="7108ced6-578b-4fbf-90af-59eca2ad4e6d" targetNamespace="http://schemas.microsoft.com/office/2006/metadata/properties" ma:root="true" ma:fieldsID="fcbbd0948a3a95004be1ab30617edaac" ns2:_="">
     <xsd:import namespace="7108ced6-578b-4fbf-90af-59eca2ad4e6d"/>
@@ -4027,6 +4237,15 @@
 </ct:contentTypeSchema>
 </file>
 
+<file path=customXml/item3.xml><?xml version="1.0" encoding="utf-8"?>
+<?mso-contentType ?>
+<FormTemplates xmlns="http://schemas.microsoft.com/sharepoint/v3/contenttype/forms">
+  <Display>DocumentLibraryForm</Display>
+  <Edit>DocumentLibraryForm</Edit>
+  <New>DocumentLibraryForm</New>
+</FormTemplates>
+</file>
+
 <file path=customXml/itemProps1.xml><?xml version="1.0" encoding="utf-8"?>
 <ds:datastoreItem xmlns:ds="http://schemas.openxmlformats.org/officeDocument/2006/customXml" ds:itemID="{A5D6D941-3357-4526-A0C0-E251BB583A20}">
   <ds:schemaRefs>
@@ -4037,14 +4256,6 @@
 </file>
 
 <file path=customXml/itemProps2.xml><?xml version="1.0" encoding="utf-8"?>
-<ds:datastoreItem xmlns:ds="http://schemas.openxmlformats.org/officeDocument/2006/customXml" ds:itemID="{047238A8-9EBF-4D18-82E0-530DA5045C3A}">
-  <ds:schemaRefs>
-    <ds:schemaRef ds:uri="http://schemas.microsoft.com/sharepoint/v3/contenttype/forms"/>
-  </ds:schemaRefs>
-</ds:datastoreItem>
-</file>
-
-<file path=customXml/itemProps3.xml><?xml version="1.0" encoding="utf-8"?>
 <ds:datastoreItem xmlns:ds="http://schemas.openxmlformats.org/officeDocument/2006/customXml" ds:itemID="{5C227D8D-94A9-4CCF-8698-E1EF772ADC24}">
   <ds:schemaRefs>
     <ds:schemaRef ds:uri="http://schemas.microsoft.com/office/2006/metadata/contentType"/>
@@ -4060,4 +4271,12 @@
     <ds:schemaRef ds:uri="http://schemas.microsoft.com/internal/obd"/>
   </ds:schemaRefs>
 </ds:datastoreItem>
+</file>
+
+<file path=customXml/itemProps3.xml><?xml version="1.0" encoding="utf-8"?>
+<ds:datastoreItem xmlns:ds="http://schemas.openxmlformats.org/officeDocument/2006/customXml" ds:itemID="{047238A8-9EBF-4D18-82E0-530DA5045C3A}">
+  <ds:schemaRefs>
+    <ds:schemaRef ds:uri="http://schemas.microsoft.com/sharepoint/v3/contenttype/forms"/>
+  </ds:schemaRefs>
+</ds:datastoreItem>
 </file>
</xml_diff>